<commit_message>
Aggiunto grafico Slide n8
</commit_message>
<xml_diff>
--- a/Presentazioni/Presentazioni PQ/Presentazione RQ.pptx
+++ b/Presentazioni/Presentazioni PQ/Presentazione RQ.pptx
@@ -26121,8 +26121,8 @@
         </p:nvSpPr>
         <p:spPr>
           <a:xfrm>
-            <a:off x="835175" y="2382787"/>
-            <a:ext cx="10460181" cy="1815882"/>
+            <a:off x="4142792" y="2382787"/>
+            <a:ext cx="7152564" cy="2677656"/>
           </a:xfrm>
           <a:prstGeom prst="rect">
             <a:avLst/>
@@ -26185,7 +26185,29 @@
                 <a:ea typeface="Microsoft YaHei" charset="-122"/>
                 <a:cs typeface="Microsoft YaHei" charset="-122"/>
               </a:rPr>
-              <a:t>Nella fase di test abbiamo configurato Sonar e </a:t>
+              <a:t>Nella fase di test abbiamo configurato </a:t>
+            </a:r>
+            <a:r>
+              <a:rPr lang="it-IT" sz="2800" dirty="0" err="1">
+                <a:solidFill>
+                  <a:srgbClr val="515151"/>
+                </a:solidFill>
+                <a:latin typeface="Microsoft YaHei" charset="-122"/>
+                <a:ea typeface="Microsoft YaHei" charset="-122"/>
+                <a:cs typeface="Microsoft YaHei" charset="-122"/>
+              </a:rPr>
+              <a:t>SonarQube</a:t>
+            </a:r>
+            <a:r>
+              <a:rPr lang="it-IT" sz="2800" dirty="0">
+                <a:solidFill>
+                  <a:srgbClr val="515151"/>
+                </a:solidFill>
+                <a:latin typeface="Microsoft YaHei" charset="-122"/>
+                <a:ea typeface="Microsoft YaHei" charset="-122"/>
+                <a:cs typeface="Microsoft YaHei" charset="-122"/>
+              </a:rPr>
+              <a:t> e </a:t>
             </a:r>
             <a:r>
               <a:rPr lang="it-IT" sz="2800" dirty="0" err="1">
@@ -26209,6 +26231,597 @@
               </a:rPr>
               <a:t> CI</a:t>
             </a:r>
+          </a:p>
+        </p:txBody>
+      </p:sp>
+      <p:pic>
+        <p:nvPicPr>
+          <p:cNvPr id="9" name="Immagine 8">
+            <a:extLst>
+              <a:ext uri="{FF2B5EF4-FFF2-40B4-BE49-F238E27FC236}">
+                <a16:creationId xmlns:a16="http://schemas.microsoft.com/office/drawing/2014/main" id="{EC25B78D-CCC7-4E5A-9F7D-86E7397EAE92}"/>
+              </a:ext>
+            </a:extLst>
+          </p:cNvPr>
+          <p:cNvPicPr>
+            <a:picLocks noChangeAspect="1"/>
+          </p:cNvPicPr>
+          <p:nvPr/>
+        </p:nvPicPr>
+        <p:blipFill>
+          <a:blip r:embed="rId2"/>
+          <a:stretch>
+            <a:fillRect/>
+          </a:stretch>
+        </p:blipFill>
+        <p:spPr>
+          <a:xfrm>
+            <a:off x="1580242" y="1017288"/>
+            <a:ext cx="770020" cy="770020"/>
+          </a:xfrm>
+          <a:prstGeom prst="rect">
+            <a:avLst/>
+          </a:prstGeom>
+        </p:spPr>
+      </p:pic>
+      <p:pic>
+        <p:nvPicPr>
+          <p:cNvPr id="13" name="Immagine 12">
+            <a:extLst>
+              <a:ext uri="{FF2B5EF4-FFF2-40B4-BE49-F238E27FC236}">
+                <a16:creationId xmlns:a16="http://schemas.microsoft.com/office/drawing/2014/main" id="{DD7E1D5E-AFF0-46E3-A1FE-9602740A2DBA}"/>
+              </a:ext>
+            </a:extLst>
+          </p:cNvPr>
+          <p:cNvPicPr>
+            <a:picLocks noChangeAspect="1"/>
+          </p:cNvPicPr>
+          <p:nvPr/>
+        </p:nvPicPr>
+        <p:blipFill>
+          <a:blip r:embed="rId3"/>
+          <a:stretch>
+            <a:fillRect/>
+          </a:stretch>
+        </p:blipFill>
+        <p:spPr>
+          <a:xfrm>
+            <a:off x="1580242" y="2389286"/>
+            <a:ext cx="770020" cy="770020"/>
+          </a:xfrm>
+          <a:prstGeom prst="rect">
+            <a:avLst/>
+          </a:prstGeom>
+        </p:spPr>
+      </p:pic>
+      <p:pic>
+        <p:nvPicPr>
+          <p:cNvPr id="15" name="Immagine 14">
+            <a:extLst>
+              <a:ext uri="{FF2B5EF4-FFF2-40B4-BE49-F238E27FC236}">
+                <a16:creationId xmlns:a16="http://schemas.microsoft.com/office/drawing/2014/main" id="{7311BBBA-2C39-4E54-8779-595343F0E44E}"/>
+              </a:ext>
+            </a:extLst>
+          </p:cNvPr>
+          <p:cNvPicPr>
+            <a:picLocks noChangeAspect="1"/>
+          </p:cNvPicPr>
+          <p:nvPr/>
+        </p:nvPicPr>
+        <p:blipFill>
+          <a:blip r:embed="rId4"/>
+          <a:stretch>
+            <a:fillRect/>
+          </a:stretch>
+        </p:blipFill>
+        <p:spPr>
+          <a:xfrm>
+            <a:off x="1542918" y="3831715"/>
+            <a:ext cx="783339" cy="777085"/>
+          </a:xfrm>
+          <a:prstGeom prst="rect">
+            <a:avLst/>
+          </a:prstGeom>
+        </p:spPr>
+      </p:pic>
+      <p:pic>
+        <p:nvPicPr>
+          <p:cNvPr id="17" name="Immagine 16">
+            <a:extLst>
+              <a:ext uri="{FF2B5EF4-FFF2-40B4-BE49-F238E27FC236}">
+                <a16:creationId xmlns:a16="http://schemas.microsoft.com/office/drawing/2014/main" id="{2FA30996-7109-445C-8841-5993F5A96EB0}"/>
+              </a:ext>
+            </a:extLst>
+          </p:cNvPr>
+          <p:cNvPicPr>
+            <a:picLocks noChangeAspect="1"/>
+          </p:cNvPicPr>
+          <p:nvPr/>
+        </p:nvPicPr>
+        <p:blipFill>
+          <a:blip r:embed="rId5"/>
+          <a:stretch>
+            <a:fillRect/>
+          </a:stretch>
+        </p:blipFill>
+        <p:spPr>
+          <a:xfrm>
+            <a:off x="432954" y="5338509"/>
+            <a:ext cx="745050" cy="745050"/>
+          </a:xfrm>
+          <a:prstGeom prst="rect">
+            <a:avLst/>
+          </a:prstGeom>
+        </p:spPr>
+      </p:pic>
+      <p:pic>
+        <p:nvPicPr>
+          <p:cNvPr id="19" name="Immagine 18">
+            <a:extLst>
+              <a:ext uri="{FF2B5EF4-FFF2-40B4-BE49-F238E27FC236}">
+                <a16:creationId xmlns:a16="http://schemas.microsoft.com/office/drawing/2014/main" id="{BAA8B248-A8D8-49F8-95E8-331AB7F0EE48}"/>
+              </a:ext>
+            </a:extLst>
+          </p:cNvPr>
+          <p:cNvPicPr>
+            <a:picLocks noChangeAspect="1"/>
+          </p:cNvPicPr>
+          <p:nvPr/>
+        </p:nvPicPr>
+        <p:blipFill>
+          <a:blip r:embed="rId6"/>
+          <a:stretch>
+            <a:fillRect/>
+          </a:stretch>
+        </p:blipFill>
+        <p:spPr>
+          <a:xfrm>
+            <a:off x="2754376" y="5138004"/>
+            <a:ext cx="1530016" cy="1530016"/>
+          </a:xfrm>
+          <a:prstGeom prst="rect">
+            <a:avLst/>
+          </a:prstGeom>
+        </p:spPr>
+      </p:pic>
+      <p:sp>
+        <p:nvSpPr>
+          <p:cNvPr id="20" name="CasellaDiTesto 19">
+            <a:extLst>
+              <a:ext uri="{FF2B5EF4-FFF2-40B4-BE49-F238E27FC236}">
+                <a16:creationId xmlns:a16="http://schemas.microsoft.com/office/drawing/2014/main" id="{B21D5CFF-9307-481A-A0C9-A4F85736D1E8}"/>
+              </a:ext>
+            </a:extLst>
+          </p:cNvPr>
+          <p:cNvSpPr txBox="1"/>
+          <p:nvPr/>
+        </p:nvSpPr>
+        <p:spPr>
+          <a:xfrm>
+            <a:off x="1165994" y="1746694"/>
+            <a:ext cx="1598515" cy="276999"/>
+          </a:xfrm>
+          <a:prstGeom prst="rect">
+            <a:avLst/>
+          </a:prstGeom>
+          <a:noFill/>
+        </p:spPr>
+        <p:txBody>
+          <a:bodyPr wrap="none" rtlCol="0">
+            <a:spAutoFit/>
+          </a:bodyPr>
+          <a:lstStyle/>
+          <a:p>
+            <a:r>
+              <a:rPr lang="it-IT" sz="1200" dirty="0">
+                <a:solidFill>
+                  <a:srgbClr val="515151"/>
+                </a:solidFill>
+                <a:latin typeface="Microsoft YaHei" charset="-122"/>
+                <a:ea typeface="Microsoft YaHei" charset="-122"/>
+              </a:rPr>
+              <a:t>Scrittura del codice</a:t>
+            </a:r>
+          </a:p>
+        </p:txBody>
+      </p:sp>
+      <p:sp>
+        <p:nvSpPr>
+          <p:cNvPr id="21" name="CasellaDiTesto 20">
+            <a:extLst>
+              <a:ext uri="{FF2B5EF4-FFF2-40B4-BE49-F238E27FC236}">
+                <a16:creationId xmlns:a16="http://schemas.microsoft.com/office/drawing/2014/main" id="{9CD56A77-0747-4E0B-9267-1AEF55BE2901}"/>
+              </a:ext>
+            </a:extLst>
+          </p:cNvPr>
+          <p:cNvSpPr txBox="1"/>
+          <p:nvPr/>
+        </p:nvSpPr>
+        <p:spPr>
+          <a:xfrm>
+            <a:off x="1610827" y="3187840"/>
+            <a:ext cx="708848" cy="276999"/>
+          </a:xfrm>
+          <a:prstGeom prst="rect">
+            <a:avLst/>
+          </a:prstGeom>
+          <a:noFill/>
+        </p:spPr>
+        <p:txBody>
+          <a:bodyPr wrap="none" rtlCol="0">
+            <a:spAutoFit/>
+          </a:bodyPr>
+          <a:lstStyle/>
+          <a:p>
+            <a:r>
+              <a:rPr lang="it-IT" sz="1200" dirty="0">
+                <a:solidFill>
+                  <a:srgbClr val="515151"/>
+                </a:solidFill>
+                <a:latin typeface="Microsoft YaHei" charset="-122"/>
+                <a:ea typeface="Microsoft YaHei" charset="-122"/>
+              </a:rPr>
+              <a:t>GitHub</a:t>
+            </a:r>
+          </a:p>
+        </p:txBody>
+      </p:sp>
+      <p:sp>
+        <p:nvSpPr>
+          <p:cNvPr id="22" name="CasellaDiTesto 21">
+            <a:extLst>
+              <a:ext uri="{FF2B5EF4-FFF2-40B4-BE49-F238E27FC236}">
+                <a16:creationId xmlns:a16="http://schemas.microsoft.com/office/drawing/2014/main" id="{F06617EB-3BC3-4C44-9662-882390AFE726}"/>
+              </a:ext>
+            </a:extLst>
+          </p:cNvPr>
+          <p:cNvSpPr txBox="1"/>
+          <p:nvPr/>
+        </p:nvSpPr>
+        <p:spPr>
+          <a:xfrm>
+            <a:off x="1580242" y="4662112"/>
+            <a:ext cx="787395" cy="276999"/>
+          </a:xfrm>
+          <a:prstGeom prst="rect">
+            <a:avLst/>
+          </a:prstGeom>
+          <a:noFill/>
+        </p:spPr>
+        <p:txBody>
+          <a:bodyPr wrap="none" rtlCol="0">
+            <a:spAutoFit/>
+          </a:bodyPr>
+          <a:lstStyle/>
+          <a:p>
+            <a:r>
+              <a:rPr lang="it-IT" sz="1200" dirty="0" err="1">
+                <a:solidFill>
+                  <a:srgbClr val="515151"/>
+                </a:solidFill>
+                <a:latin typeface="Microsoft YaHei" charset="-122"/>
+                <a:ea typeface="Microsoft YaHei" charset="-122"/>
+              </a:rPr>
+              <a:t>Travis</a:t>
+            </a:r>
+            <a:r>
+              <a:rPr lang="it-IT" sz="1200" dirty="0">
+                <a:solidFill>
+                  <a:srgbClr val="515151"/>
+                </a:solidFill>
+                <a:latin typeface="Microsoft YaHei" charset="-122"/>
+                <a:ea typeface="Microsoft YaHei" charset="-122"/>
+              </a:rPr>
+              <a:t> CI</a:t>
+            </a:r>
+          </a:p>
+        </p:txBody>
+      </p:sp>
+      <p:sp>
+        <p:nvSpPr>
+          <p:cNvPr id="23" name="CasellaDiTesto 22">
+            <a:extLst>
+              <a:ext uri="{FF2B5EF4-FFF2-40B4-BE49-F238E27FC236}">
+                <a16:creationId xmlns:a16="http://schemas.microsoft.com/office/drawing/2014/main" id="{2EA451CF-3976-4D24-9032-A79A2F434841}"/>
+              </a:ext>
+            </a:extLst>
+          </p:cNvPr>
+          <p:cNvSpPr txBox="1"/>
+          <p:nvPr/>
+        </p:nvSpPr>
+        <p:spPr>
+          <a:xfrm>
+            <a:off x="99035" y="6236018"/>
+            <a:ext cx="1412887" cy="276999"/>
+          </a:xfrm>
+          <a:prstGeom prst="rect">
+            <a:avLst/>
+          </a:prstGeom>
+          <a:noFill/>
+        </p:spPr>
+        <p:txBody>
+          <a:bodyPr wrap="none" rtlCol="0">
+            <a:spAutoFit/>
+          </a:bodyPr>
+          <a:lstStyle/>
+          <a:p>
+            <a:r>
+              <a:rPr lang="it-IT" sz="1200" dirty="0" err="1">
+                <a:solidFill>
+                  <a:srgbClr val="515151"/>
+                </a:solidFill>
+                <a:latin typeface="Microsoft YaHei" charset="-122"/>
+                <a:ea typeface="Microsoft YaHei" charset="-122"/>
+              </a:rPr>
+              <a:t>Better</a:t>
+            </a:r>
+            <a:r>
+              <a:rPr lang="it-IT" sz="1200" dirty="0">
+                <a:solidFill>
+                  <a:srgbClr val="515151"/>
+                </a:solidFill>
+                <a:latin typeface="Microsoft YaHei" charset="-122"/>
+                <a:ea typeface="Microsoft YaHei" charset="-122"/>
+              </a:rPr>
+              <a:t> Code </a:t>
+            </a:r>
+            <a:r>
+              <a:rPr lang="it-IT" sz="1200" dirty="0" err="1">
+                <a:solidFill>
+                  <a:srgbClr val="515151"/>
+                </a:solidFill>
+                <a:latin typeface="Microsoft YaHei" charset="-122"/>
+                <a:ea typeface="Microsoft YaHei" charset="-122"/>
+              </a:rPr>
+              <a:t>Hub</a:t>
+            </a:r>
+            <a:endParaRPr lang="it-IT" sz="1200" dirty="0">
+              <a:solidFill>
+                <a:srgbClr val="515151"/>
+              </a:solidFill>
+              <a:latin typeface="Microsoft YaHei" charset="-122"/>
+              <a:ea typeface="Microsoft YaHei" charset="-122"/>
+            </a:endParaRPr>
+          </a:p>
+        </p:txBody>
+      </p:sp>
+      <p:sp>
+        <p:nvSpPr>
+          <p:cNvPr id="24" name="CasellaDiTesto 23">
+            <a:extLst>
+              <a:ext uri="{FF2B5EF4-FFF2-40B4-BE49-F238E27FC236}">
+                <a16:creationId xmlns:a16="http://schemas.microsoft.com/office/drawing/2014/main" id="{59364EBF-FC2E-4F07-9041-397132480549}"/>
+              </a:ext>
+            </a:extLst>
+          </p:cNvPr>
+          <p:cNvSpPr txBox="1"/>
+          <p:nvPr/>
+        </p:nvSpPr>
+        <p:spPr>
+          <a:xfrm>
+            <a:off x="2842776" y="6236017"/>
+            <a:ext cx="1013419" cy="276999"/>
+          </a:xfrm>
+          <a:prstGeom prst="rect">
+            <a:avLst/>
+          </a:prstGeom>
+          <a:noFill/>
+        </p:spPr>
+        <p:txBody>
+          <a:bodyPr wrap="none" rtlCol="0">
+            <a:spAutoFit/>
+          </a:bodyPr>
+          <a:lstStyle/>
+          <a:p>
+            <a:r>
+              <a:rPr lang="it-IT" sz="1200" dirty="0" err="1">
+                <a:solidFill>
+                  <a:srgbClr val="515151"/>
+                </a:solidFill>
+                <a:latin typeface="Microsoft YaHei" charset="-122"/>
+                <a:ea typeface="Microsoft YaHei" charset="-122"/>
+              </a:rPr>
+              <a:t>SonarQube</a:t>
+            </a:r>
+            <a:endParaRPr lang="it-IT" sz="1200" dirty="0">
+              <a:solidFill>
+                <a:srgbClr val="515151"/>
+              </a:solidFill>
+              <a:latin typeface="Microsoft YaHei" charset="-122"/>
+              <a:ea typeface="Microsoft YaHei" charset="-122"/>
+            </a:endParaRPr>
+          </a:p>
+        </p:txBody>
+      </p:sp>
+      <p:sp>
+        <p:nvSpPr>
+          <p:cNvPr id="26" name="Freccia a inversione 25">
+            <a:extLst>
+              <a:ext uri="{FF2B5EF4-FFF2-40B4-BE49-F238E27FC236}">
+                <a16:creationId xmlns:a16="http://schemas.microsoft.com/office/drawing/2014/main" id="{52B819ED-DB99-4F31-9317-3005EB2D544F}"/>
+              </a:ext>
+            </a:extLst>
+          </p:cNvPr>
+          <p:cNvSpPr/>
+          <p:nvPr/>
+        </p:nvSpPr>
+        <p:spPr>
+          <a:xfrm rot="5400000">
+            <a:off x="1919185" y="1978236"/>
+            <a:ext cx="1545250" cy="469870"/>
+          </a:xfrm>
+          <a:prstGeom prst="uturnArrow">
+            <a:avLst/>
+          </a:prstGeom>
+        </p:spPr>
+        <p:style>
+          <a:lnRef idx="2">
+            <a:schemeClr val="accent1">
+              <a:shade val="50000"/>
+            </a:schemeClr>
+          </a:lnRef>
+          <a:fillRef idx="1">
+            <a:schemeClr val="accent1"/>
+          </a:fillRef>
+          <a:effectRef idx="0">
+            <a:schemeClr val="accent1"/>
+          </a:effectRef>
+          <a:fontRef idx="minor">
+            <a:schemeClr val="lt1"/>
+          </a:fontRef>
+        </p:style>
+        <p:txBody>
+          <a:bodyPr rtlCol="0" anchor="ctr"/>
+          <a:lstStyle/>
+          <a:p>
+            <a:pPr algn="r"/>
+            <a:endParaRPr lang="it-IT" dirty="0">
+              <a:solidFill>
+                <a:schemeClr val="tx1"/>
+              </a:solidFill>
+            </a:endParaRPr>
+          </a:p>
+        </p:txBody>
+      </p:sp>
+      <p:sp>
+        <p:nvSpPr>
+          <p:cNvPr id="27" name="Freccia a inversione 26">
+            <a:extLst>
+              <a:ext uri="{FF2B5EF4-FFF2-40B4-BE49-F238E27FC236}">
+                <a16:creationId xmlns:a16="http://schemas.microsoft.com/office/drawing/2014/main" id="{9256637A-C683-490A-8CF7-409F76005E1E}"/>
+              </a:ext>
+            </a:extLst>
+          </p:cNvPr>
+          <p:cNvSpPr/>
+          <p:nvPr/>
+        </p:nvSpPr>
+        <p:spPr>
+          <a:xfrm rot="16200000" flipH="1">
+            <a:off x="346910" y="3385609"/>
+            <a:ext cx="1638560" cy="469870"/>
+          </a:xfrm>
+          <a:prstGeom prst="uturnArrow">
+            <a:avLst/>
+          </a:prstGeom>
+        </p:spPr>
+        <p:style>
+          <a:lnRef idx="2">
+            <a:schemeClr val="accent1">
+              <a:shade val="50000"/>
+            </a:schemeClr>
+          </a:lnRef>
+          <a:fillRef idx="1">
+            <a:schemeClr val="accent1"/>
+          </a:fillRef>
+          <a:effectRef idx="0">
+            <a:schemeClr val="accent1"/>
+          </a:effectRef>
+          <a:fontRef idx="minor">
+            <a:schemeClr val="lt1"/>
+          </a:fontRef>
+        </p:style>
+        <p:txBody>
+          <a:bodyPr rtlCol="0" anchor="ctr"/>
+          <a:lstStyle/>
+          <a:p>
+            <a:pPr algn="r"/>
+            <a:endParaRPr lang="it-IT" dirty="0">
+              <a:solidFill>
+                <a:schemeClr val="tx1"/>
+              </a:solidFill>
+            </a:endParaRPr>
+          </a:p>
+        </p:txBody>
+      </p:sp>
+      <p:sp>
+        <p:nvSpPr>
+          <p:cNvPr id="30" name="Rettangolo 29">
+            <a:extLst>
+              <a:ext uri="{FF2B5EF4-FFF2-40B4-BE49-F238E27FC236}">
+                <a16:creationId xmlns:a16="http://schemas.microsoft.com/office/drawing/2014/main" id="{933D4939-2BA0-4616-BE8A-1ACE6C2D6F02}"/>
+              </a:ext>
+            </a:extLst>
+          </p:cNvPr>
+          <p:cNvSpPr/>
+          <p:nvPr/>
+        </p:nvSpPr>
+        <p:spPr>
+          <a:xfrm>
+            <a:off x="1899073" y="4975676"/>
+            <a:ext cx="134234" cy="742943"/>
+          </a:xfrm>
+          <a:prstGeom prst="rect">
+            <a:avLst/>
+          </a:prstGeom>
+        </p:spPr>
+        <p:style>
+          <a:lnRef idx="2">
+            <a:schemeClr val="accent1">
+              <a:shade val="50000"/>
+            </a:schemeClr>
+          </a:lnRef>
+          <a:fillRef idx="1">
+            <a:schemeClr val="accent1"/>
+          </a:fillRef>
+          <a:effectRef idx="0">
+            <a:schemeClr val="accent1"/>
+          </a:effectRef>
+          <a:fontRef idx="minor">
+            <a:schemeClr val="lt1"/>
+          </a:fontRef>
+        </p:style>
+        <p:txBody>
+          <a:bodyPr rtlCol="0" anchor="ctr"/>
+          <a:lstStyle/>
+          <a:p>
+            <a:pPr algn="ctr"/>
+            <a:endParaRPr lang="it-IT"/>
+          </a:p>
+        </p:txBody>
+      </p:sp>
+      <p:sp>
+        <p:nvSpPr>
+          <p:cNvPr id="29" name="Freccia bidirezionale orizzontale 28">
+            <a:extLst>
+              <a:ext uri="{FF2B5EF4-FFF2-40B4-BE49-F238E27FC236}">
+                <a16:creationId xmlns:a16="http://schemas.microsoft.com/office/drawing/2014/main" id="{0FFEDB25-4648-4EF9-AF77-8D192D616680}"/>
+              </a:ext>
+            </a:extLst>
+          </p:cNvPr>
+          <p:cNvSpPr/>
+          <p:nvPr/>
+        </p:nvSpPr>
+        <p:spPr>
+          <a:xfrm>
+            <a:off x="1307826" y="5626359"/>
+            <a:ext cx="1316728" cy="223362"/>
+          </a:xfrm>
+          <a:prstGeom prst="leftRightArrow">
+            <a:avLst/>
+          </a:prstGeom>
+        </p:spPr>
+        <p:style>
+          <a:lnRef idx="2">
+            <a:schemeClr val="accent1">
+              <a:shade val="50000"/>
+            </a:schemeClr>
+          </a:lnRef>
+          <a:fillRef idx="1">
+            <a:schemeClr val="accent1"/>
+          </a:fillRef>
+          <a:effectRef idx="0">
+            <a:schemeClr val="accent1"/>
+          </a:effectRef>
+          <a:fontRef idx="minor">
+            <a:schemeClr val="lt1"/>
+          </a:fontRef>
+        </p:style>
+        <p:txBody>
+          <a:bodyPr rtlCol="0" anchor="ctr"/>
+          <a:lstStyle/>
+          <a:p>
+            <a:pPr algn="ctr"/>
+            <a:endParaRPr lang="it-IT"/>
           </a:p>
         </p:txBody>
       </p:sp>

</xml_diff>

<commit_message>
Modifica animazioni slide n8
</commit_message>
<xml_diff>
--- a/Presentazioni/Presentazioni PQ/Presentazione RQ.pptx
+++ b/Presentazioni/Presentazioni PQ/Presentazione RQ.pptx
@@ -26948,6 +26948,109 @@
                       </p:childTnLst>
                     </p:cTn>
                   </p:par>
+                  <p:par>
+                    <p:cTn id="9" fill="hold">
+                      <p:stCondLst>
+                        <p:cond delay="indefinite"/>
+                      </p:stCondLst>
+                      <p:childTnLst>
+                        <p:par>
+                          <p:cTn id="10" fill="hold">
+                            <p:stCondLst>
+                              <p:cond delay="0"/>
+                            </p:stCondLst>
+                            <p:childTnLst>
+                              <p:par>
+                                <p:cTn id="11" presetID="2" presetClass="entr" presetSubtype="4" fill="hold" nodeType="clickEffect">
+                                  <p:stCondLst>
+                                    <p:cond delay="0"/>
+                                  </p:stCondLst>
+                                  <p:childTnLst>
+                                    <p:set>
+                                      <p:cBhvr>
+                                        <p:cTn id="12" dur="1" fill="hold">
+                                          <p:stCondLst>
+                                            <p:cond delay="0"/>
+                                          </p:stCondLst>
+                                        </p:cTn>
+                                        <p:tgtEl>
+                                          <p:spTgt spid="3">
+                                            <p:txEl>
+                                              <p:pRg st="2" end="2"/>
+                                            </p:txEl>
+                                          </p:spTgt>
+                                        </p:tgtEl>
+                                        <p:attrNameLst>
+                                          <p:attrName>style.visibility</p:attrName>
+                                        </p:attrNameLst>
+                                      </p:cBhvr>
+                                      <p:to>
+                                        <p:strVal val="visible"/>
+                                      </p:to>
+                                    </p:set>
+                                    <p:anim calcmode="lin" valueType="num">
+                                      <p:cBhvr additive="base">
+                                        <p:cTn id="13" dur="500" fill="hold"/>
+                                        <p:tgtEl>
+                                          <p:spTgt spid="3">
+                                            <p:txEl>
+                                              <p:pRg st="2" end="2"/>
+                                            </p:txEl>
+                                          </p:spTgt>
+                                        </p:tgtEl>
+                                        <p:attrNameLst>
+                                          <p:attrName>ppt_x</p:attrName>
+                                        </p:attrNameLst>
+                                      </p:cBhvr>
+                                      <p:tavLst>
+                                        <p:tav tm="0">
+                                          <p:val>
+                                            <p:strVal val="#ppt_x"/>
+                                          </p:val>
+                                        </p:tav>
+                                        <p:tav tm="100000">
+                                          <p:val>
+                                            <p:strVal val="#ppt_x"/>
+                                          </p:val>
+                                        </p:tav>
+                                      </p:tavLst>
+                                    </p:anim>
+                                    <p:anim calcmode="lin" valueType="num">
+                                      <p:cBhvr additive="base">
+                                        <p:cTn id="14" dur="500" fill="hold"/>
+                                        <p:tgtEl>
+                                          <p:spTgt spid="3">
+                                            <p:txEl>
+                                              <p:pRg st="2" end="2"/>
+                                            </p:txEl>
+                                          </p:spTgt>
+                                        </p:tgtEl>
+                                        <p:attrNameLst>
+                                          <p:attrName>ppt_y</p:attrName>
+                                        </p:attrNameLst>
+                                      </p:cBhvr>
+                                      <p:tavLst>
+                                        <p:tav tm="0">
+                                          <p:val>
+                                            <p:strVal val="1+#ppt_h/2"/>
+                                          </p:val>
+                                        </p:tav>
+                                        <p:tav tm="100000">
+                                          <p:val>
+                                            <p:strVal val="#ppt_y"/>
+                                          </p:val>
+                                        </p:tav>
+                                      </p:tavLst>
+                                    </p:anim>
+                                  </p:childTnLst>
+                                </p:cTn>
+                              </p:par>
+                            </p:childTnLst>
+                          </p:cTn>
+                        </p:par>
+                      </p:childTnLst>
+                    </p:cTn>
+                  </p:par>
                 </p:childTnLst>
               </p:cTn>
               <p:prevCondLst>

</xml_diff>

<commit_message>
Modifica tabella slide n15
</commit_message>
<xml_diff>
--- a/Presentazioni/Presentazioni PQ/Presentazione RQ.pptx
+++ b/Presentazioni/Presentazioni PQ/Presentazione RQ.pptx
@@ -11779,13 +11779,13 @@
           <p:nvPr>
             <p:extLst>
               <p:ext uri="{D42A27DB-BD31-4B8C-83A1-F6EECF244321}">
-                <p14:modId xmlns:p14="http://schemas.microsoft.com/office/powerpoint/2010/main" val="1398432913"/>
+                <p14:modId xmlns:p14="http://schemas.microsoft.com/office/powerpoint/2010/main" val="1939925593"/>
               </p:ext>
             </p:extLst>
           </p:nvPr>
         </p:nvGraphicFramePr>
         <p:xfrm>
-          <a:off x="1493322" y="2097178"/>
+          <a:off x="1348853" y="2097178"/>
           <a:ext cx="9432825" cy="3819045"/>
         </p:xfrm>
         <a:graphic>
@@ -27098,7 +27098,7 @@
         <p:spPr>
           <a:xfrm>
             <a:off x="531225" y="2523164"/>
-            <a:ext cx="11138227" cy="3539430"/>
+            <a:ext cx="11138227" cy="3908762"/>
           </a:xfrm>
           <a:prstGeom prst="rect">
             <a:avLst/>
@@ -27271,7 +27271,7 @@
                 <a:ea typeface="Microsoft YaHei" charset="-122"/>
                 <a:cs typeface="Microsoft YaHei" charset="-122"/>
               </a:rPr>
-              <a:t>Difficile in 15 minuti includere il funzionamento di </a:t>
+              <a:t>Difficile in 15 minuti esporre l’architettura di </a:t>
             </a:r>
             <a:r>
               <a:rPr lang="it-IT" sz="2400" dirty="0" err="1">
@@ -27282,16 +27282,19 @@
                 <a:ea typeface="Microsoft YaHei" charset="-122"/>
                 <a:cs typeface="Microsoft YaHei" charset="-122"/>
               </a:rPr>
-              <a:t>deSpeect</a:t>
+              <a:t>DeSpeect</a:t>
             </a:r>
-            <a:endParaRPr lang="it-IT" sz="2400" dirty="0">
-              <a:solidFill>
-                <a:srgbClr val="515151"/>
-              </a:solidFill>
-              <a:latin typeface="Microsoft YaHei" charset="-122"/>
-              <a:ea typeface="Microsoft YaHei" charset="-122"/>
-              <a:cs typeface="Microsoft YaHei" charset="-122"/>
-            </a:endParaRPr>
+            <a:r>
+              <a:rPr lang="it-IT" sz="2400" dirty="0">
+                <a:solidFill>
+                  <a:srgbClr val="515151"/>
+                </a:solidFill>
+                <a:latin typeface="Microsoft YaHei" charset="-122"/>
+                <a:ea typeface="Microsoft YaHei" charset="-122"/>
+                <a:cs typeface="Microsoft YaHei" charset="-122"/>
+              </a:rPr>
+              <a:t> senza nessuna conoscenza pregressa</a:t>
+            </a:r>
           </a:p>
         </p:txBody>
       </p:sp>

</xml_diff>